<commit_message>
just correct a mistake I made in logic model
</commit_message>
<xml_diff>
--- a/Class Presentations/Group presentation LEADS updated.pptx
+++ b/Class Presentations/Group presentation LEADS updated.pptx
@@ -113,6 +113,22 @@
       </a:defRPr>
     </a:lvl9pPr>
   </p:defaultTextStyle>
+  <p:extLst>
+    <p:ext uri="{EFAFB233-063F-42B5-8137-9DF3F51BA10A}">
+      <p15:sldGuideLst xmlns:p15="http://schemas.microsoft.com/office/powerpoint/2012/main">
+        <p15:guide id="1" orient="horz" pos="2160">
+          <p15:clr>
+            <a:srgbClr val="A4A3A4"/>
+          </p15:clr>
+        </p15:guide>
+        <p15:guide id="2" pos="2880">
+          <p15:clr>
+            <a:srgbClr val="A4A3A4"/>
+          </p15:clr>
+        </p15:guide>
+      </p15:sldGuideLst>
+    </p:ext>
+  </p:extLst>
 </p:presentation>
 </file>
 
@@ -5728,7 +5744,7 @@
           <a:p>
             <a:fld id="{A76E7539-BFEF-E349-A497-068EDCDC3B49}" type="datetimeFigureOut">
               <a:rPr lang="en-US" smtClean="0"/>
-              <a:t>3/24/15</a:t>
+              <a:t>3/25/2015</a:t>
             </a:fld>
             <a:endParaRPr lang="en-US"/>
           </a:p>
@@ -5770,7 +5786,7 @@
           <a:p>
             <a:fld id="{B1228A61-269F-5D4E-BE49-4CDCACD51ED7}" type="slidenum">
               <a:rPr lang="en-US" smtClean="0"/>
-              <a:t>‹#›</a:t>
+              <a:t>‹N°›</a:t>
             </a:fld>
             <a:endParaRPr lang="en-US"/>
           </a:p>
@@ -5898,7 +5914,7 @@
           <a:p>
             <a:fld id="{A76E7539-BFEF-E349-A497-068EDCDC3B49}" type="datetimeFigureOut">
               <a:rPr lang="en-US" smtClean="0"/>
-              <a:t>3/24/15</a:t>
+              <a:t>3/25/2015</a:t>
             </a:fld>
             <a:endParaRPr lang="en-US"/>
           </a:p>
@@ -5940,7 +5956,7 @@
           <a:p>
             <a:fld id="{B1228A61-269F-5D4E-BE49-4CDCACD51ED7}" type="slidenum">
               <a:rPr lang="en-US" smtClean="0"/>
-              <a:t>‹#›</a:t>
+              <a:t>‹N°›</a:t>
             </a:fld>
             <a:endParaRPr lang="en-US"/>
           </a:p>
@@ -6078,7 +6094,7 @@
           <a:p>
             <a:fld id="{A76E7539-BFEF-E349-A497-068EDCDC3B49}" type="datetimeFigureOut">
               <a:rPr lang="en-US" smtClean="0"/>
-              <a:t>3/24/15</a:t>
+              <a:t>3/25/2015</a:t>
             </a:fld>
             <a:endParaRPr lang="en-US"/>
           </a:p>
@@ -6120,7 +6136,7 @@
           <a:p>
             <a:fld id="{B1228A61-269F-5D4E-BE49-4CDCACD51ED7}" type="slidenum">
               <a:rPr lang="en-US" smtClean="0"/>
-              <a:t>‹#›</a:t>
+              <a:t>‹N°›</a:t>
             </a:fld>
             <a:endParaRPr lang="en-US"/>
           </a:p>
@@ -6248,7 +6264,7 @@
           <a:p>
             <a:fld id="{A76E7539-BFEF-E349-A497-068EDCDC3B49}" type="datetimeFigureOut">
               <a:rPr lang="en-US" smtClean="0"/>
-              <a:t>3/24/15</a:t>
+              <a:t>3/25/2015</a:t>
             </a:fld>
             <a:endParaRPr lang="en-US"/>
           </a:p>
@@ -6271,7 +6287,7 @@
           <a:p>
             <a:fld id="{B1228A61-269F-5D4E-BE49-4CDCACD51ED7}" type="slidenum">
               <a:rPr lang="en-US" smtClean="0"/>
-              <a:t>‹#›</a:t>
+              <a:t>‹N°›</a:t>
             </a:fld>
             <a:endParaRPr lang="en-US"/>
           </a:p>
@@ -6505,7 +6521,7 @@
           <a:p>
             <a:fld id="{A76E7539-BFEF-E349-A497-068EDCDC3B49}" type="datetimeFigureOut">
               <a:rPr lang="en-US" smtClean="0"/>
-              <a:t>3/24/15</a:t>
+              <a:t>3/25/2015</a:t>
             </a:fld>
             <a:endParaRPr lang="en-US"/>
           </a:p>
@@ -6547,7 +6563,7 @@
           <a:p>
             <a:fld id="{B1228A61-269F-5D4E-BE49-4CDCACD51ED7}" type="slidenum">
               <a:rPr lang="en-US" smtClean="0"/>
-              <a:t>‹#›</a:t>
+              <a:t>‹N°›</a:t>
             </a:fld>
             <a:endParaRPr lang="en-US"/>
           </a:p>
@@ -6793,7 +6809,7 @@
           <a:p>
             <a:fld id="{A76E7539-BFEF-E349-A497-068EDCDC3B49}" type="datetimeFigureOut">
               <a:rPr lang="en-US" smtClean="0"/>
-              <a:t>3/24/15</a:t>
+              <a:t>3/25/2015</a:t>
             </a:fld>
             <a:endParaRPr lang="en-US"/>
           </a:p>
@@ -6835,7 +6851,7 @@
           <a:p>
             <a:fld id="{B1228A61-269F-5D4E-BE49-4CDCACD51ED7}" type="slidenum">
               <a:rPr lang="en-US" smtClean="0"/>
-              <a:t>‹#›</a:t>
+              <a:t>‹N°›</a:t>
             </a:fld>
             <a:endParaRPr lang="en-US"/>
           </a:p>
@@ -7215,7 +7231,7 @@
           <a:p>
             <a:fld id="{A76E7539-BFEF-E349-A497-068EDCDC3B49}" type="datetimeFigureOut">
               <a:rPr lang="en-US" smtClean="0"/>
-              <a:t>3/24/15</a:t>
+              <a:t>3/25/2015</a:t>
             </a:fld>
             <a:endParaRPr lang="en-US"/>
           </a:p>
@@ -7257,7 +7273,7 @@
           <a:p>
             <a:fld id="{B1228A61-269F-5D4E-BE49-4CDCACD51ED7}" type="slidenum">
               <a:rPr lang="en-US" smtClean="0"/>
-              <a:t>‹#›</a:t>
+              <a:t>‹N°›</a:t>
             </a:fld>
             <a:endParaRPr lang="en-US"/>
           </a:p>
@@ -7333,7 +7349,7 @@
           <a:p>
             <a:fld id="{A76E7539-BFEF-E349-A497-068EDCDC3B49}" type="datetimeFigureOut">
               <a:rPr lang="en-US" smtClean="0"/>
-              <a:t>3/24/15</a:t>
+              <a:t>3/25/2015</a:t>
             </a:fld>
             <a:endParaRPr lang="en-US"/>
           </a:p>
@@ -7375,7 +7391,7 @@
           <a:p>
             <a:fld id="{B1228A61-269F-5D4E-BE49-4CDCACD51ED7}" type="slidenum">
               <a:rPr lang="en-US" smtClean="0"/>
-              <a:t>‹#›</a:t>
+              <a:t>‹N°›</a:t>
             </a:fld>
             <a:endParaRPr lang="en-US"/>
           </a:p>
@@ -7428,7 +7444,7 @@
           <a:p>
             <a:fld id="{A76E7539-BFEF-E349-A497-068EDCDC3B49}" type="datetimeFigureOut">
               <a:rPr lang="en-US" smtClean="0"/>
-              <a:t>3/24/15</a:t>
+              <a:t>3/25/2015</a:t>
             </a:fld>
             <a:endParaRPr lang="en-US"/>
           </a:p>
@@ -7470,7 +7486,7 @@
           <a:p>
             <a:fld id="{B1228A61-269F-5D4E-BE49-4CDCACD51ED7}" type="slidenum">
               <a:rPr lang="en-US" smtClean="0"/>
-              <a:t>‹#›</a:t>
+              <a:t>‹N°›</a:t>
             </a:fld>
             <a:endParaRPr lang="en-US"/>
           </a:p>
@@ -7705,7 +7721,7 @@
           <a:p>
             <a:fld id="{A76E7539-BFEF-E349-A497-068EDCDC3B49}" type="datetimeFigureOut">
               <a:rPr lang="en-US" smtClean="0"/>
-              <a:t>3/24/15</a:t>
+              <a:t>3/25/2015</a:t>
             </a:fld>
             <a:endParaRPr lang="en-US"/>
           </a:p>
@@ -7747,7 +7763,7 @@
           <a:p>
             <a:fld id="{B1228A61-269F-5D4E-BE49-4CDCACD51ED7}" type="slidenum">
               <a:rPr lang="en-US" smtClean="0"/>
-              <a:t>‹#›</a:t>
+              <a:t>‹N°›</a:t>
             </a:fld>
             <a:endParaRPr lang="en-US"/>
           </a:p>
@@ -7958,7 +7974,7 @@
           <a:p>
             <a:fld id="{A76E7539-BFEF-E349-A497-068EDCDC3B49}" type="datetimeFigureOut">
               <a:rPr lang="en-US" smtClean="0"/>
-              <a:t>3/24/15</a:t>
+              <a:t>3/25/2015</a:t>
             </a:fld>
             <a:endParaRPr lang="en-US"/>
           </a:p>
@@ -8000,7 +8016,7 @@
           <a:p>
             <a:fld id="{B1228A61-269F-5D4E-BE49-4CDCACD51ED7}" type="slidenum">
               <a:rPr lang="en-US" smtClean="0"/>
-              <a:t>‹#›</a:t>
+              <a:t>‹N°›</a:t>
             </a:fld>
             <a:endParaRPr lang="en-US"/>
           </a:p>
@@ -8171,7 +8187,7 @@
           <a:p>
             <a:fld id="{A76E7539-BFEF-E349-A497-068EDCDC3B49}" type="datetimeFigureOut">
               <a:rPr lang="en-US" smtClean="0"/>
-              <a:t>3/24/15</a:t>
+              <a:t>3/25/2015</a:t>
             </a:fld>
             <a:endParaRPr lang="en-US"/>
           </a:p>
@@ -8249,7 +8265,7 @@
           <a:p>
             <a:fld id="{B1228A61-269F-5D4E-BE49-4CDCACD51ED7}" type="slidenum">
               <a:rPr lang="en-US" smtClean="0"/>
-              <a:t>‹#›</a:t>
+              <a:t>‹N°›</a:t>
             </a:fld>
             <a:endParaRPr lang="en-US"/>
           </a:p>
@@ -8619,7 +8635,7 @@
   <p:timing>
     <p:tnLst>
       <p:par>
-        <p:cTn xmlns:p14="http://schemas.microsoft.com/office/powerpoint/2010/main" id="1" dur="indefinite" restart="never" nodeType="tmRoot"/>
+        <p:cTn id="1" dur="indefinite" restart="never" nodeType="tmRoot"/>
       </p:par>
     </p:tnLst>
   </p:timing>
@@ -8716,7 +8732,7 @@
   <p:timing>
     <p:tnLst>
       <p:par>
-        <p:cTn xmlns:p14="http://schemas.microsoft.com/office/powerpoint/2010/main" id="1" dur="indefinite" restart="never" nodeType="tmRoot"/>
+        <p:cTn id="1" dur="indefinite" restart="never" nodeType="tmRoot"/>
       </p:par>
     </p:tnLst>
   </p:timing>
@@ -8947,7 +8963,7 @@
   <p:timing>
     <p:tnLst>
       <p:par>
-        <p:cTn xmlns:p14="http://schemas.microsoft.com/office/powerpoint/2010/main" id="1" dur="indefinite" restart="never" nodeType="tmRoot"/>
+        <p:cTn id="1" dur="indefinite" restart="never" nodeType="tmRoot"/>
       </p:par>
     </p:tnLst>
   </p:timing>
@@ -9138,7 +9154,7 @@
   <p:timing>
     <p:tnLst>
       <p:par>
-        <p:cTn xmlns:p14="http://schemas.microsoft.com/office/powerpoint/2010/main" id="1" dur="indefinite" restart="never" nodeType="tmRoot"/>
+        <p:cTn id="1" dur="indefinite" restart="never" nodeType="tmRoot"/>
       </p:par>
     </p:tnLst>
   </p:timing>
@@ -9197,7 +9213,7 @@
   <p:timing>
     <p:tnLst>
       <p:par>
-        <p:cTn xmlns:p14="http://schemas.microsoft.com/office/powerpoint/2010/main" id="1" dur="indefinite" restart="never" nodeType="tmRoot"/>
+        <p:cTn id="1" dur="indefinite" restart="never" nodeType="tmRoot"/>
       </p:par>
     </p:tnLst>
   </p:timing>
@@ -9291,7 +9307,7 @@
   <p:timing>
     <p:tnLst>
       <p:par>
-        <p:cTn xmlns:p14="http://schemas.microsoft.com/office/powerpoint/2010/main" id="1" dur="indefinite" restart="never" nodeType="tmRoot"/>
+        <p:cTn id="1" dur="indefinite" restart="never" nodeType="tmRoot"/>
       </p:par>
     </p:tnLst>
   </p:timing>
@@ -10212,7 +10228,7 @@
   <p:timing>
     <p:tnLst>
       <p:par>
-        <p:cTn xmlns:p14="http://schemas.microsoft.com/office/powerpoint/2010/main" id="1" dur="indefinite" restart="never" nodeType="tmRoot"/>
+        <p:cTn id="1" dur="indefinite" restart="never" nodeType="tmRoot"/>
       </p:par>
     </p:tnLst>
   </p:timing>
@@ -10991,11 +11007,7 @@
             </a:pPr>
             <a:r>
               <a:rPr lang="en-US" sz="1600" dirty="0"/>
-              <a:t>Better environment due to the decrease of emissions</a:t>
-            </a:r>
-            <a:r>
-              <a:rPr lang="en-US" sz="1600" dirty="0"/>
-              <a:t> </a:t>
+              <a:t>Better environment due to the decrease of emissions </a:t>
             </a:r>
           </a:p>
         </p:txBody>
@@ -11013,7 +11025,7 @@
   <p:timing>
     <p:tnLst>
       <p:par>
-        <p:cTn xmlns:p14="http://schemas.microsoft.com/office/powerpoint/2010/main" id="1" dur="indefinite" restart="never" nodeType="tmRoot"/>
+        <p:cTn id="1" dur="indefinite" restart="never" nodeType="tmRoot"/>
       </p:par>
     </p:tnLst>
   </p:timing>
@@ -11646,10 +11658,10 @@
                   <a:srgbClr val="000000"/>
                 </a:solidFill>
               </a:rPr>
-              <a:t>N</a:t>
-            </a:r>
-            <a:r>
-              <a:rPr lang="en-US" sz="1600" baseline="-25000" dirty="0">
+              <a:t>H</a:t>
+            </a:r>
+            <a:r>
+              <a:rPr lang="en-US" sz="1600" baseline="-25000" smtClean="0">
                 <a:solidFill>
                   <a:srgbClr val="000000"/>
                 </a:solidFill>
@@ -11657,12 +11669,20 @@
               <a:t>2</a:t>
             </a:r>
             <a:r>
+              <a:rPr lang="en-US" sz="1600" smtClean="0">
+                <a:solidFill>
+                  <a:srgbClr val="000000"/>
+                </a:solidFill>
+              </a:rPr>
+              <a:t> </a:t>
+            </a:r>
+            <a:r>
               <a:rPr lang="en-US" sz="1600" dirty="0">
                 <a:solidFill>
                   <a:srgbClr val="000000"/>
                 </a:solidFill>
               </a:rPr>
-              <a:t> technology</a:t>
+              <a:t>technology</a:t>
             </a:r>
             <a:endParaRPr lang="en-US" sz="1600" dirty="0">
               <a:latin typeface="Arial"/>
@@ -11701,7 +11721,7 @@
   <p:timing>
     <p:tnLst>
       <p:par>
-        <p:cTn xmlns:p14="http://schemas.microsoft.com/office/powerpoint/2010/main" id="1" dur="indefinite" restart="never" nodeType="tmRoot"/>
+        <p:cTn id="1" dur="indefinite" restart="never" nodeType="tmRoot"/>
       </p:par>
     </p:tnLst>
   </p:timing>

</xml_diff>

<commit_message>
getting started with the research
</commit_message>
<xml_diff>
--- a/Class Presentations/Group presentation LEADS updated.pptx
+++ b/Class Presentations/Group presentation LEADS updated.pptx
@@ -11661,7 +11661,7 @@
               <a:t>H</a:t>
             </a:r>
             <a:r>
-              <a:rPr lang="en-US" sz="1600" baseline="-25000" smtClean="0">
+              <a:rPr lang="en-US" sz="1600" baseline="-25000" dirty="0" smtClean="0">
                 <a:solidFill>
                   <a:srgbClr val="000000"/>
                 </a:solidFill>
@@ -11669,7 +11669,7 @@
               <a:t>2</a:t>
             </a:r>
             <a:r>
-              <a:rPr lang="en-US" sz="1600" smtClean="0">
+              <a:rPr lang="en-US" sz="1600" dirty="0" smtClean="0">
                 <a:solidFill>
                   <a:srgbClr val="000000"/>
                 </a:solidFill>

</xml_diff>